<commit_message>
Atualização da documentação. Criação do PBI´s: 1.7, 1.8, 2.8, 2.9, 3.3, 3.4, 3.5
</commit_message>
<xml_diff>
--- a/DOCUMENTACAO/PBB_Chamuze/PBB_Chamuze.pptx
+++ b/DOCUMENTACAO/PBB_Chamuze/PBB_Chamuze.pptx
@@ -115,14 +115,7 @@
 <file path=ppt/revisionInfo.xml><?xml version="1.0" encoding="utf-8"?>
 <p1510:revInfo xmlns:a="http://schemas.openxmlformats.org/drawingml/2006/main" xmlns:r="http://schemas.openxmlformats.org/officeDocument/2006/relationships" xmlns:p1510="http://schemas.microsoft.com/office/powerpoint/2015/10/main">
   <p1510:revLst>
-    <p1510:client id="{0475F045-FE87-9055-8975-DCEC3429C2BF}" v="71" dt="2025-03-14T12:24:19.588"/>
-    <p1510:client id="{167BBDD0-1E0E-171F-230D-D1BEE75D2901}" v="62" dt="2025-03-14T12:02:53.095"/>
-    <p1510:client id="{218EB677-C5E3-1012-07F5-4784B1C3DAC5}" v="3" dt="2025-03-14T14:50:58.418"/>
-    <p1510:client id="{391BA007-233B-4BAF-B5F0-89E3CFBD95C2}" v="296" dt="2025-03-14T15:17:42.633"/>
-    <p1510:client id="{46C1D56F-8A09-F7C8-5597-82E54F424E20}" v="53" dt="2025-03-14T12:25:09.010"/>
-    <p1510:client id="{58B83D06-3ABE-35F9-5403-6E2DC9723A97}" v="102" dt="2025-03-14T14:45:54.339"/>
-    <p1510:client id="{6EA881C2-9320-F186-139A-0CDCE96AF514}" v="101" dt="2025-03-14T14:34:46.691"/>
-    <p1510:client id="{F65BD6A4-62FA-5C68-CD59-74B2373B44E5}" v="4" dt="2025-03-14T14:29:03.090"/>
+    <p1510:client id="{A4C306AC-132F-4732-B05A-AF36B7023F70}" v="17" dt="2025-05-09T13:06:02.913"/>
   </p1510:revLst>
 </p1510:revInfo>
 </file>
@@ -285,7 +278,7 @@
           <a:p>
             <a:fld id="{86D6501E-0A14-4629-8FBF-0ACFB116140F}" type="datetimeFigureOut">
               <a:rPr lang="pt-BR" smtClean="0"/>
-              <a:t>23/04/2025</a:t>
+              <a:t>16/05/2025</a:t>
             </a:fld>
             <a:endParaRPr lang="pt-BR"/>
           </a:p>
@@ -515,7 +508,7 @@
           <a:p>
             <a:fld id="{86D6501E-0A14-4629-8FBF-0ACFB116140F}" type="datetimeFigureOut">
               <a:rPr lang="pt-BR" smtClean="0"/>
-              <a:t>23/04/2025</a:t>
+              <a:t>16/05/2025</a:t>
             </a:fld>
             <a:endParaRPr lang="pt-BR"/>
           </a:p>
@@ -750,7 +743,7 @@
           <a:p>
             <a:fld id="{86D6501E-0A14-4629-8FBF-0ACFB116140F}" type="datetimeFigureOut">
               <a:rPr lang="pt-BR" smtClean="0"/>
-              <a:t>23/04/2025</a:t>
+              <a:t>16/05/2025</a:t>
             </a:fld>
             <a:endParaRPr lang="pt-BR"/>
           </a:p>
@@ -980,7 +973,7 @@
           <a:p>
             <a:fld id="{86D6501E-0A14-4629-8FBF-0ACFB116140F}" type="datetimeFigureOut">
               <a:rPr lang="pt-BR" smtClean="0"/>
-              <a:t>23/04/2025</a:t>
+              <a:t>16/05/2025</a:t>
             </a:fld>
             <a:endParaRPr lang="pt-BR"/>
           </a:p>
@@ -1282,7 +1275,7 @@
           <a:p>
             <a:fld id="{86D6501E-0A14-4629-8FBF-0ACFB116140F}" type="datetimeFigureOut">
               <a:rPr lang="pt-BR" smtClean="0"/>
-              <a:t>23/04/2025</a:t>
+              <a:t>16/05/2025</a:t>
             </a:fld>
             <a:endParaRPr lang="pt-BR"/>
           </a:p>
@@ -1577,7 +1570,7 @@
           <a:p>
             <a:fld id="{86D6501E-0A14-4629-8FBF-0ACFB116140F}" type="datetimeFigureOut">
               <a:rPr lang="pt-BR" smtClean="0"/>
-              <a:t>23/04/2025</a:t>
+              <a:t>16/05/2025</a:t>
             </a:fld>
             <a:endParaRPr lang="pt-BR"/>
           </a:p>
@@ -2025,7 +2018,7 @@
           <a:p>
             <a:fld id="{86D6501E-0A14-4629-8FBF-0ACFB116140F}" type="datetimeFigureOut">
               <a:rPr lang="pt-BR" smtClean="0"/>
-              <a:t>23/04/2025</a:t>
+              <a:t>16/05/2025</a:t>
             </a:fld>
             <a:endParaRPr lang="pt-BR"/>
           </a:p>
@@ -2190,7 +2183,7 @@
           <a:p>
             <a:fld id="{86D6501E-0A14-4629-8FBF-0ACFB116140F}" type="datetimeFigureOut">
               <a:rPr lang="pt-BR" smtClean="0"/>
-              <a:t>23/04/2025</a:t>
+              <a:t>16/05/2025</a:t>
             </a:fld>
             <a:endParaRPr lang="pt-BR"/>
           </a:p>
@@ -2327,7 +2320,7 @@
           <a:p>
             <a:fld id="{86D6501E-0A14-4629-8FBF-0ACFB116140F}" type="datetimeFigureOut">
               <a:rPr lang="pt-BR" smtClean="0"/>
-              <a:t>23/04/2025</a:t>
+              <a:t>16/05/2025</a:t>
             </a:fld>
             <a:endParaRPr lang="pt-BR"/>
           </a:p>
@@ -2668,7 +2661,7 @@
           <a:p>
             <a:fld id="{86D6501E-0A14-4629-8FBF-0ACFB116140F}" type="datetimeFigureOut">
               <a:rPr lang="pt-BR" smtClean="0"/>
-              <a:t>23/04/2025</a:t>
+              <a:t>16/05/2025</a:t>
             </a:fld>
             <a:endParaRPr lang="pt-BR"/>
           </a:p>
@@ -2986,7 +2979,7 @@
           <a:p>
             <a:fld id="{86D6501E-0A14-4629-8FBF-0ACFB116140F}" type="datetimeFigureOut">
               <a:rPr lang="pt-BR" smtClean="0"/>
-              <a:t>23/04/2025</a:t>
+              <a:t>16/05/2025</a:t>
             </a:fld>
             <a:endParaRPr lang="pt-BR"/>
           </a:p>
@@ -7101,7 +7094,12 @@
             <a:prstGeom prst="rect">
               <a:avLst/>
             </a:prstGeom>
-            <a:grpFill/>
+            <a:solidFill>
+              <a:schemeClr val="accent2">
+                <a:lumMod val="60000"/>
+                <a:lumOff val="40000"/>
+              </a:schemeClr>
+            </a:solidFill>
             <a:ln>
               <a:solidFill>
                 <a:schemeClr val="bg1">
@@ -7356,7 +7354,7 @@
         </p:nvGrpSpPr>
         <p:grpSpPr>
           <a:xfrm>
-            <a:off x="5638238" y="3993857"/>
+            <a:off x="6814266" y="3956327"/>
             <a:ext cx="2415362" cy="2450700"/>
             <a:chOff x="4897539" y="3965820"/>
             <a:chExt cx="2415362" cy="2450700"/>
@@ -7829,10 +7827,10 @@
         </p:nvGrpSpPr>
         <p:grpSpPr>
           <a:xfrm>
-            <a:off x="9127453" y="4424549"/>
-            <a:ext cx="2443697" cy="1132394"/>
-            <a:chOff x="9825117" y="3191101"/>
-            <a:chExt cx="2443697" cy="1132394"/>
+            <a:off x="9500617" y="4446529"/>
+            <a:ext cx="1143057" cy="1129654"/>
+            <a:chOff x="9825117" y="3193841"/>
+            <a:chExt cx="1143057" cy="1129654"/>
           </a:xfrm>
           <a:solidFill>
             <a:schemeClr val="bg1">
@@ -7854,7 +7852,7 @@
           </p:nvSpPr>
           <p:spPr>
             <a:xfrm>
-              <a:off x="9825117" y="3191101"/>
+              <a:off x="9835117" y="3193841"/>
               <a:ext cx="1133057" cy="528764"/>
             </a:xfrm>
             <a:prstGeom prst="rect">
@@ -7929,81 +7927,6 @@
         </p:sp>
         <p:sp>
           <p:nvSpPr>
-            <p:cNvPr id="83" name="Retângulo 82">
-              <a:extLst>
-                <a:ext uri="{FF2B5EF4-FFF2-40B4-BE49-F238E27FC236}">
-                  <a16:creationId xmlns:a16="http://schemas.microsoft.com/office/drawing/2014/main" id="{4D529764-09AA-D4D3-A857-8F949DD40F4D}"/>
-                </a:ext>
-              </a:extLst>
-            </p:cNvPr>
-            <p:cNvSpPr/>
-            <p:nvPr/>
-          </p:nvSpPr>
-          <p:spPr>
-            <a:xfrm>
-              <a:off x="11135757" y="3225937"/>
-              <a:ext cx="1133057" cy="528764"/>
-            </a:xfrm>
-            <a:prstGeom prst="rect">
-              <a:avLst/>
-            </a:prstGeom>
-            <a:grpFill/>
-            <a:ln>
-              <a:solidFill>
-                <a:schemeClr val="bg1">
-                  <a:lumMod val="50000"/>
-                </a:schemeClr>
-              </a:solidFill>
-            </a:ln>
-            <a:effectLst>
-              <a:outerShdw blurRad="50800" dist="38100" dir="5400000" algn="t" rotWithShape="0">
-                <a:prstClr val="black">
-                  <a:alpha val="40000"/>
-                </a:prstClr>
-              </a:outerShdw>
-            </a:effectLst>
-          </p:spPr>
-          <p:style>
-            <a:lnRef idx="1">
-              <a:schemeClr val="accent4"/>
-            </a:lnRef>
-            <a:fillRef idx="2">
-              <a:schemeClr val="accent4"/>
-            </a:fillRef>
-            <a:effectRef idx="1">
-              <a:schemeClr val="accent4"/>
-            </a:effectRef>
-            <a:fontRef idx="minor">
-              <a:schemeClr val="dk1"/>
-            </a:fontRef>
-          </p:style>
-          <p:txBody>
-            <a:bodyPr lIns="0" tIns="0" rIns="0" bIns="0" rtlCol="0" anchor="ctr"/>
-            <a:lstStyle/>
-            <a:p>
-              <a:pPr algn="ctr"/>
-              <a:r>
-                <a:rPr lang="pt-BR" sz="800" dirty="0">
-                  <a:ea typeface="Calibri"/>
-                  <a:cs typeface="Calibri"/>
-                </a:rPr>
-                <a:t>Analisar </a:t>
-              </a:r>
-            </a:p>
-            <a:p>
-              <a:pPr algn="ctr"/>
-              <a:r>
-                <a:rPr lang="pt-BR" sz="800" dirty="0">
-                  <a:ea typeface="Calibri"/>
-                  <a:cs typeface="Calibri"/>
-                </a:rPr>
-                <a:t>necessidade de implementação</a:t>
-              </a:r>
-            </a:p>
-          </p:txBody>
-        </p:sp>
-        <p:sp>
-          <p:nvSpPr>
             <p:cNvPr id="84" name="Retângulo 83">
               <a:extLst>
                 <a:ext uri="{FF2B5EF4-FFF2-40B4-BE49-F238E27FC236}">
@@ -8022,7 +7945,12 @@
             <a:prstGeom prst="rect">
               <a:avLst/>
             </a:prstGeom>
-            <a:grpFill/>
+            <a:solidFill>
+              <a:schemeClr val="accent2">
+                <a:lumMod val="60000"/>
+                <a:lumOff val="40000"/>
+              </a:schemeClr>
+            </a:solidFill>
             <a:ln>
               <a:solidFill>
                 <a:schemeClr val="bg1">
@@ -8678,7 +8606,7 @@
         </p:nvSpPr>
         <p:spPr>
           <a:xfrm>
-            <a:off x="5638239" y="3993857"/>
+            <a:off x="6814267" y="3956327"/>
             <a:ext cx="1133057" cy="528764"/>
           </a:xfrm>
           <a:prstGeom prst="rect">
@@ -8765,7 +8693,7 @@
         </p:nvSpPr>
         <p:spPr>
           <a:xfrm>
-            <a:off x="5638238" y="4599057"/>
+            <a:off x="6814266" y="4561527"/>
             <a:ext cx="1133057" cy="528764"/>
           </a:xfrm>
           <a:prstGeom prst="rect">
@@ -8852,14 +8780,17 @@
         </p:nvSpPr>
         <p:spPr>
           <a:xfrm>
-            <a:off x="10438093" y="3826400"/>
+            <a:off x="10811257" y="3845640"/>
             <a:ext cx="1133057" cy="528764"/>
           </a:xfrm>
           <a:prstGeom prst="rect">
             <a:avLst/>
           </a:prstGeom>
           <a:solidFill>
-            <a:schemeClr val="bg1"/>
+            <a:schemeClr val="accent2">
+              <a:lumMod val="60000"/>
+              <a:lumOff val="40000"/>
+            </a:schemeClr>
           </a:solidFill>
           <a:ln>
             <a:solidFill>
@@ -8937,7 +8868,7 @@
         </p:nvSpPr>
         <p:spPr>
           <a:xfrm>
-            <a:off x="9127453" y="3826400"/>
+            <a:off x="9500617" y="3845640"/>
             <a:ext cx="1133057" cy="528764"/>
           </a:xfrm>
           <a:prstGeom prst="rect">
@@ -9024,14 +8955,17 @@
         </p:nvSpPr>
         <p:spPr>
           <a:xfrm>
-            <a:off x="9127453" y="5698995"/>
+            <a:off x="9500617" y="5718235"/>
             <a:ext cx="1133057" cy="528764"/>
           </a:xfrm>
           <a:prstGeom prst="rect">
             <a:avLst/>
           </a:prstGeom>
           <a:solidFill>
-            <a:schemeClr val="bg1"/>
+            <a:schemeClr val="accent2">
+              <a:lumMod val="60000"/>
+              <a:lumOff val="40000"/>
+            </a:schemeClr>
           </a:solidFill>
           <a:ln>
             <a:solidFill>
@@ -9441,6 +9375,277 @@
             <a:r>
               <a:rPr lang="pt-BR" sz="800" dirty="0"/>
               <a:t>Propostas com valores personalizados pelos prestadores.</a:t>
+            </a:r>
+          </a:p>
+        </p:txBody>
+      </p:sp>
+      <p:sp>
+        <p:nvSpPr>
+          <p:cNvPr id="35" name="Retângulo 34">
+            <a:extLst>
+              <a:ext uri="{FF2B5EF4-FFF2-40B4-BE49-F238E27FC236}">
+                <a16:creationId xmlns:a16="http://schemas.microsoft.com/office/drawing/2014/main" id="{33078AAD-878F-3231-1658-C6E8BAA1B9B3}"/>
+              </a:ext>
+            </a:extLst>
+          </p:cNvPr>
+          <p:cNvSpPr/>
+          <p:nvPr/>
+        </p:nvSpPr>
+        <p:spPr>
+          <a:xfrm>
+            <a:off x="4126701" y="5949526"/>
+            <a:ext cx="1133057" cy="528764"/>
+          </a:xfrm>
+          <a:prstGeom prst="rect">
+            <a:avLst/>
+          </a:prstGeom>
+          <a:solidFill>
+            <a:schemeClr val="accent2">
+              <a:lumMod val="60000"/>
+              <a:lumOff val="40000"/>
+            </a:schemeClr>
+          </a:solidFill>
+          <a:ln>
+            <a:solidFill>
+              <a:schemeClr val="bg1">
+                <a:lumMod val="50000"/>
+              </a:schemeClr>
+            </a:solidFill>
+          </a:ln>
+          <a:effectLst>
+            <a:outerShdw blurRad="50800" dist="38100" dir="5400000" algn="t" rotWithShape="0">
+              <a:prstClr val="black">
+                <a:alpha val="40000"/>
+              </a:prstClr>
+            </a:outerShdw>
+          </a:effectLst>
+        </p:spPr>
+        <p:style>
+          <a:lnRef idx="1">
+            <a:schemeClr val="accent4"/>
+          </a:lnRef>
+          <a:fillRef idx="2">
+            <a:schemeClr val="accent4"/>
+          </a:fillRef>
+          <a:effectRef idx="1">
+            <a:schemeClr val="accent4"/>
+          </a:effectRef>
+          <a:fontRef idx="minor">
+            <a:schemeClr val="dk1"/>
+          </a:fontRef>
+        </p:style>
+        <p:txBody>
+          <a:bodyPr lIns="0" tIns="0" rIns="0" bIns="0" rtlCol="0" anchor="ctr"/>
+          <a:lstStyle/>
+          <a:p>
+            <a:pPr algn="ctr"/>
+            <a:r>
+              <a:rPr lang="pt-BR" sz="800" dirty="0">
+                <a:ea typeface="Calibri"/>
+                <a:cs typeface="Calibri"/>
+              </a:rPr>
+              <a:t>Enviar </a:t>
+            </a:r>
+          </a:p>
+          <a:p>
+            <a:pPr algn="ctr"/>
+            <a:r>
+              <a:rPr lang="pt-BR" sz="800" dirty="0">
+                <a:ea typeface="Calibri"/>
+                <a:cs typeface="Calibri"/>
+              </a:rPr>
+              <a:t>Mensagem</a:t>
+            </a:r>
+          </a:p>
+          <a:p>
+            <a:pPr algn="ctr"/>
+            <a:r>
+              <a:rPr lang="pt-BR" sz="800" dirty="0">
+                <a:ea typeface="Calibri"/>
+                <a:cs typeface="Calibri"/>
+              </a:rPr>
+              <a:t>Para o prestador</a:t>
+            </a:r>
+          </a:p>
+        </p:txBody>
+      </p:sp>
+      <p:sp>
+        <p:nvSpPr>
+          <p:cNvPr id="40" name="Retângulo 39">
+            <a:extLst>
+              <a:ext uri="{FF2B5EF4-FFF2-40B4-BE49-F238E27FC236}">
+                <a16:creationId xmlns:a16="http://schemas.microsoft.com/office/drawing/2014/main" id="{BBD95F13-57C4-AEB3-14B9-3103F72B8BC6}"/>
+              </a:ext>
+            </a:extLst>
+          </p:cNvPr>
+          <p:cNvSpPr/>
+          <p:nvPr/>
+        </p:nvSpPr>
+        <p:spPr>
+          <a:xfrm>
+            <a:off x="6827156" y="5874324"/>
+            <a:ext cx="1133057" cy="528764"/>
+          </a:xfrm>
+          <a:prstGeom prst="rect">
+            <a:avLst/>
+          </a:prstGeom>
+          <a:solidFill>
+            <a:schemeClr val="accent2">
+              <a:lumMod val="60000"/>
+              <a:lumOff val="40000"/>
+            </a:schemeClr>
+          </a:solidFill>
+          <a:ln>
+            <a:solidFill>
+              <a:schemeClr val="bg1">
+                <a:lumMod val="50000"/>
+              </a:schemeClr>
+            </a:solidFill>
+          </a:ln>
+          <a:effectLst>
+            <a:outerShdw blurRad="50800" dist="38100" dir="5400000" algn="t" rotWithShape="0">
+              <a:prstClr val="black">
+                <a:alpha val="40000"/>
+              </a:prstClr>
+            </a:outerShdw>
+          </a:effectLst>
+        </p:spPr>
+        <p:style>
+          <a:lnRef idx="1">
+            <a:schemeClr val="accent4"/>
+          </a:lnRef>
+          <a:fillRef idx="2">
+            <a:schemeClr val="accent4"/>
+          </a:fillRef>
+          <a:effectRef idx="1">
+            <a:schemeClr val="accent4"/>
+          </a:effectRef>
+          <a:fontRef idx="minor">
+            <a:schemeClr val="dk1"/>
+          </a:fontRef>
+        </p:style>
+        <p:txBody>
+          <a:bodyPr lIns="0" tIns="0" rIns="0" bIns="0" rtlCol="0" anchor="ctr"/>
+          <a:lstStyle/>
+          <a:p>
+            <a:pPr algn="ctr"/>
+            <a:r>
+              <a:rPr lang="pt-BR" sz="800" dirty="0">
+                <a:ea typeface="Calibri"/>
+                <a:cs typeface="Calibri"/>
+              </a:rPr>
+              <a:t>Realizar a</a:t>
+            </a:r>
+          </a:p>
+          <a:p>
+            <a:pPr algn="ctr"/>
+            <a:r>
+              <a:rPr lang="pt-BR" sz="800" dirty="0">
+                <a:ea typeface="Calibri"/>
+                <a:cs typeface="Calibri"/>
+              </a:rPr>
+              <a:t>Avaliação </a:t>
+            </a:r>
+          </a:p>
+          <a:p>
+            <a:pPr algn="ctr"/>
+            <a:r>
+              <a:rPr lang="pt-BR" sz="800" dirty="0">
+                <a:ea typeface="Calibri"/>
+                <a:cs typeface="Calibri"/>
+              </a:rPr>
+              <a:t>De solicitantes</a:t>
+            </a:r>
+            <a:endParaRPr lang="pt-BR" dirty="0"/>
+          </a:p>
+        </p:txBody>
+      </p:sp>
+      <p:sp>
+        <p:nvSpPr>
+          <p:cNvPr id="44" name="Retângulo 43">
+            <a:extLst>
+              <a:ext uri="{FF2B5EF4-FFF2-40B4-BE49-F238E27FC236}">
+                <a16:creationId xmlns:a16="http://schemas.microsoft.com/office/drawing/2014/main" id="{D2D0AA64-1361-A6D2-2D8B-57673E2A62DF}"/>
+              </a:ext>
+            </a:extLst>
+          </p:cNvPr>
+          <p:cNvSpPr/>
+          <p:nvPr/>
+        </p:nvSpPr>
+        <p:spPr>
+          <a:xfrm>
+            <a:off x="5534619" y="3967123"/>
+            <a:ext cx="1133057" cy="528764"/>
+          </a:xfrm>
+          <a:prstGeom prst="rect">
+            <a:avLst/>
+          </a:prstGeom>
+          <a:solidFill>
+            <a:schemeClr val="accent2">
+              <a:lumMod val="60000"/>
+              <a:lumOff val="40000"/>
+            </a:schemeClr>
+          </a:solidFill>
+          <a:ln>
+            <a:solidFill>
+              <a:schemeClr val="bg1">
+                <a:lumMod val="50000"/>
+              </a:schemeClr>
+            </a:solidFill>
+          </a:ln>
+          <a:effectLst>
+            <a:outerShdw blurRad="50800" dist="38100" dir="5400000" algn="t" rotWithShape="0">
+              <a:prstClr val="black">
+                <a:alpha val="40000"/>
+              </a:prstClr>
+            </a:outerShdw>
+          </a:effectLst>
+        </p:spPr>
+        <p:style>
+          <a:lnRef idx="1">
+            <a:schemeClr val="accent4"/>
+          </a:lnRef>
+          <a:fillRef idx="2">
+            <a:schemeClr val="accent4"/>
+          </a:fillRef>
+          <a:effectRef idx="1">
+            <a:schemeClr val="accent4"/>
+          </a:effectRef>
+          <a:fontRef idx="minor">
+            <a:schemeClr val="dk1"/>
+          </a:fontRef>
+        </p:style>
+        <p:txBody>
+          <a:bodyPr lIns="0" tIns="0" rIns="0" bIns="0" rtlCol="0" anchor="ctr"/>
+          <a:lstStyle/>
+          <a:p>
+            <a:pPr algn="ctr"/>
+            <a:r>
+              <a:rPr lang="pt-BR" sz="800" dirty="0">
+                <a:ea typeface="Calibri"/>
+                <a:cs typeface="Calibri"/>
+              </a:rPr>
+              <a:t>Enviar </a:t>
+            </a:r>
+          </a:p>
+          <a:p>
+            <a:pPr algn="ctr"/>
+            <a:r>
+              <a:rPr lang="pt-BR" sz="800" dirty="0">
+                <a:ea typeface="Calibri"/>
+                <a:cs typeface="Calibri"/>
+              </a:rPr>
+              <a:t>Mensagem</a:t>
+            </a:r>
+          </a:p>
+          <a:p>
+            <a:pPr algn="ctr"/>
+            <a:r>
+              <a:rPr lang="pt-BR" sz="800" dirty="0">
+                <a:ea typeface="Calibri"/>
+                <a:cs typeface="Calibri"/>
+              </a:rPr>
+              <a:t>Para o solicitante</a:t>
             </a:r>
           </a:p>
         </p:txBody>

</xml_diff>